<commit_message>
Finished public engagement video.
</commit_message>
<xml_diff>
--- a/Deliverables/EngagementVideo/video_animation.pptx
+++ b/Deliverables/EngagementVideo/video_animation.pptx
@@ -3896,11 +3896,11 @@
       </p:sp>
       <p:pic>
         <p:nvPicPr>
-          <p:cNvPr id="6" name="Audio 5">
+          <p:cNvPr id="20" name="Audio 19">
             <a:hlinkClick r:id="" action="ppaction://media"/>
             <a:extLst>
               <a:ext uri="{FF2B5EF4-FFF2-40B4-BE49-F238E27FC236}">
-                <a16:creationId xmlns:a16="http://schemas.microsoft.com/office/drawing/2014/main" id="{8CAB0552-ECA1-4F34-B4F2-749E0F0FD7D2}"/>
+                <a16:creationId xmlns:a16="http://schemas.microsoft.com/office/drawing/2014/main" id="{8969421F-758D-42EE-9E03-DD3AED583748}"/>
               </a:ext>
             </a:extLst>
           </p:cNvPr>
@@ -3944,10 +3944,10 @@
   </p:clrMapOvr>
   <mc:AlternateContent xmlns:mc="http://schemas.openxmlformats.org/markup-compatibility/2006">
     <mc:Choice xmlns:p14="http://schemas.microsoft.com/office/powerpoint/2010/main" Requires="p14">
-      <p:transition spd="slow" p14:dur="2000" advTm="3249"/>
+      <p:transition spd="slow" p14:dur="2000" advTm="3957"/>
     </mc:Choice>
     <mc:Fallback>
-      <p:transition spd="slow" advTm="3249"/>
+      <p:transition spd="slow" advTm="3957"/>
     </mc:Fallback>
   </mc:AlternateContent>
   <p:timing>
@@ -3983,7 +3983,7 @@
                                       <p:cBhvr>
                                         <p:cTn id="6" dur="1" fill="hold"/>
                                         <p:tgtEl>
-                                          <p:spTgt spid="6"/>
+                                          <p:spTgt spid="20"/>
                                         </p:tgtEl>
                                       </p:cBhvr>
                                     </p:cmd>
@@ -4028,7 +4028,7 @@
                   </p:endCondLst>
                 </p:cTn>
                 <p:tgtEl>
-                  <p:spTgt spid="6"/>
+                  <p:spTgt spid="20"/>
                 </p:tgtEl>
               </p:cMediaNode>
             </p:audio>
@@ -9015,11 +9015,11 @@
       </p:grpSp>
       <p:pic>
         <p:nvPicPr>
-          <p:cNvPr id="11" name="Audio 10">
+          <p:cNvPr id="41" name="Audio 40">
             <a:hlinkClick r:id="" action="ppaction://media"/>
             <a:extLst>
               <a:ext uri="{FF2B5EF4-FFF2-40B4-BE49-F238E27FC236}">
-                <a16:creationId xmlns:a16="http://schemas.microsoft.com/office/drawing/2014/main" id="{00AE757C-4AF6-4D5A-8DEC-DB124F8559DA}"/>
+                <a16:creationId xmlns:a16="http://schemas.microsoft.com/office/drawing/2014/main" id="{E9136973-71CA-4AEC-BD57-5AD22CF82BEF}"/>
               </a:ext>
             </a:extLst>
           </p:cNvPr>
@@ -9066,10 +9066,10 @@
   </p:clrMapOvr>
   <mc:AlternateContent xmlns:mc="http://schemas.openxmlformats.org/markup-compatibility/2006">
     <mc:Choice xmlns:p14="http://schemas.microsoft.com/office/powerpoint/2010/main" Requires="p14">
-      <p:transition spd="slow" p14:dur="2000" advTm="36797"/>
+      <p:transition spd="slow" p14:dur="2000" advTm="28082"/>
     </mc:Choice>
     <mc:Fallback>
-      <p:transition spd="slow" advTm="36797"/>
+      <p:transition spd="slow" advTm="28082"/>
     </mc:Fallback>
   </mc:AlternateContent>
   <p:timing>
@@ -9105,7 +9105,7 @@
                                       <p:cBhvr>
                                         <p:cTn id="6" dur="1" fill="hold"/>
                                         <p:tgtEl>
-                                          <p:spTgt spid="11"/>
+                                          <p:spTgt spid="41"/>
                                         </p:tgtEl>
                                       </p:cBhvr>
                                     </p:cmd>
@@ -9669,7 +9669,7 @@
                   </p:endCondLst>
                 </p:cTn>
                 <p:tgtEl>
-                  <p:spTgt spid="11"/>
+                  <p:spTgt spid="41"/>
                 </p:tgtEl>
               </p:cMediaNode>
             </p:audio>
@@ -10523,11 +10523,11 @@
       </p:grpSp>
       <p:pic>
         <p:nvPicPr>
-          <p:cNvPr id="5" name="Audio 4">
+          <p:cNvPr id="12" name="Audio 11">
             <a:hlinkClick r:id="" action="ppaction://media"/>
             <a:extLst>
               <a:ext uri="{FF2B5EF4-FFF2-40B4-BE49-F238E27FC236}">
-                <a16:creationId xmlns:a16="http://schemas.microsoft.com/office/drawing/2014/main" id="{B977CACE-AF46-4AD7-959E-9F4B82C0C103}"/>
+                <a16:creationId xmlns:a16="http://schemas.microsoft.com/office/drawing/2014/main" id="{D3995DC6-13ED-45BD-BA43-6E5DF63464D1}"/>
               </a:ext>
             </a:extLst>
           </p:cNvPr>
@@ -10574,10 +10574,10 @@
   </p:clrMapOvr>
   <mc:AlternateContent xmlns:mc="http://schemas.openxmlformats.org/markup-compatibility/2006">
     <mc:Choice xmlns:p14="http://schemas.microsoft.com/office/powerpoint/2010/main" Requires="p14">
-      <p:transition spd="slow" p14:dur="2000" advTm="25438"/>
+      <p:transition spd="slow" p14:dur="2000" advTm="30666"/>
     </mc:Choice>
     <mc:Fallback>
-      <p:transition spd="slow" advTm="25438"/>
+      <p:transition spd="slow" advTm="30666"/>
     </mc:Fallback>
   </mc:AlternateContent>
   <p:timing>
@@ -10613,7 +10613,7 @@
                                       <p:cBhvr>
                                         <p:cTn id="6" dur="1" fill="hold"/>
                                         <p:tgtEl>
-                                          <p:spTgt spid="5"/>
+                                          <p:spTgt spid="12"/>
                                         </p:tgtEl>
                                       </p:cBhvr>
                                     </p:cmd>
@@ -11699,7 +11699,7 @@
                   </p:endCondLst>
                 </p:cTn>
                 <p:tgtEl>
-                  <p:spTgt spid="5"/>
+                  <p:spTgt spid="12"/>
                 </p:tgtEl>
               </p:cMediaNode>
             </p:audio>
@@ -12051,11 +12051,11 @@
       </p:grpSp>
       <p:pic>
         <p:nvPicPr>
-          <p:cNvPr id="5" name="Audio 4">
+          <p:cNvPr id="8" name="Audio 7">
             <a:hlinkClick r:id="" action="ppaction://media"/>
             <a:extLst>
               <a:ext uri="{FF2B5EF4-FFF2-40B4-BE49-F238E27FC236}">
-                <a16:creationId xmlns:a16="http://schemas.microsoft.com/office/drawing/2014/main" id="{94EF8309-DD1B-4B25-B72C-531E7ED49EE8}"/>
+                <a16:creationId xmlns:a16="http://schemas.microsoft.com/office/drawing/2014/main" id="{AFB713F0-6230-4A5D-A04D-35461948B8BB}"/>
               </a:ext>
             </a:extLst>
           </p:cNvPr>
@@ -12102,10 +12102,10 @@
   </p:clrMapOvr>
   <mc:AlternateContent xmlns:mc="http://schemas.openxmlformats.org/markup-compatibility/2006">
     <mc:Choice xmlns:p14="http://schemas.microsoft.com/office/powerpoint/2010/main" Requires="p14">
-      <p:transition spd="slow" p14:dur="2000" advTm="21103"/>
+      <p:transition spd="slow" p14:dur="2000" advTm="8101"/>
     </mc:Choice>
     <mc:Fallback>
-      <p:transition spd="slow" advTm="21103"/>
+      <p:transition spd="slow" advTm="8101"/>
     </mc:Fallback>
   </mc:AlternateContent>
   <p:timing>
@@ -12141,7 +12141,7 @@
                                       <p:cBhvr>
                                         <p:cTn id="6" dur="1" fill="hold"/>
                                         <p:tgtEl>
-                                          <p:spTgt spid="5"/>
+                                          <p:spTgt spid="8"/>
                                         </p:tgtEl>
                                       </p:cBhvr>
                                     </p:cmd>
@@ -12387,7 +12387,7 @@
                   </p:endCondLst>
                 </p:cTn>
                 <p:tgtEl>
-                  <p:spTgt spid="5"/>
+                  <p:spTgt spid="8"/>
                 </p:tgtEl>
               </p:cMediaNode>
             </p:audio>
@@ -24406,11 +24406,11 @@
       </p:sp>
       <p:pic>
         <p:nvPicPr>
-          <p:cNvPr id="4" name="Audio 3">
+          <p:cNvPr id="1044" name="Audio 1043">
             <a:hlinkClick r:id="" action="ppaction://media"/>
             <a:extLst>
               <a:ext uri="{FF2B5EF4-FFF2-40B4-BE49-F238E27FC236}">
-                <a16:creationId xmlns:a16="http://schemas.microsoft.com/office/drawing/2014/main" id="{429A641E-81D1-4503-9694-D61467B73B5E}"/>
+                <a16:creationId xmlns:a16="http://schemas.microsoft.com/office/drawing/2014/main" id="{4D644E5A-E4D7-4DDB-B6B1-884BCD68EFB8}"/>
               </a:ext>
             </a:extLst>
           </p:cNvPr>
@@ -24457,10 +24457,10 @@
   </p:clrMapOvr>
   <mc:AlternateContent xmlns:mc="http://schemas.openxmlformats.org/markup-compatibility/2006">
     <mc:Choice xmlns:p14="http://schemas.microsoft.com/office/powerpoint/2010/main" Requires="p14">
-      <p:transition spd="slow" p14:dur="2000" advTm="42818"/>
+      <p:transition spd="slow" p14:dur="2000" advTm="36669"/>
     </mc:Choice>
     <mc:Fallback>
-      <p:transition spd="slow" advTm="42818"/>
+      <p:transition spd="slow" advTm="36669"/>
     </mc:Fallback>
   </mc:AlternateContent>
   <p:timing>
@@ -24496,7 +24496,7 @@
                                       <p:cBhvr>
                                         <p:cTn id="6" dur="1" fill="hold"/>
                                         <p:tgtEl>
-                                          <p:spTgt spid="4"/>
+                                          <p:spTgt spid="1044"/>
                                         </p:tgtEl>
                                       </p:cBhvr>
                                     </p:cmd>
@@ -26672,7 +26672,7 @@
                   </p:endCondLst>
                 </p:cTn>
                 <p:tgtEl>
-                  <p:spTgt spid="4"/>
+                  <p:spTgt spid="1044"/>
                 </p:tgtEl>
               </p:cMediaNode>
             </p:audio>
@@ -27187,11 +27187,11 @@
       </p:cxnSp>
       <p:pic>
         <p:nvPicPr>
-          <p:cNvPr id="3" name="Audio 2">
+          <p:cNvPr id="22" name="Audio 21">
             <a:hlinkClick r:id="" action="ppaction://media"/>
             <a:extLst>
               <a:ext uri="{FF2B5EF4-FFF2-40B4-BE49-F238E27FC236}">
-                <a16:creationId xmlns:a16="http://schemas.microsoft.com/office/drawing/2014/main" id="{0280A69E-F53A-42C4-B155-E93E3482794A}"/>
+                <a16:creationId xmlns:a16="http://schemas.microsoft.com/office/drawing/2014/main" id="{C7908A8F-F905-40D4-AC7A-146BDE4D8855}"/>
               </a:ext>
             </a:extLst>
           </p:cNvPr>
@@ -27238,10 +27238,10 @@
   </p:clrMapOvr>
   <mc:AlternateContent xmlns:mc="http://schemas.openxmlformats.org/markup-compatibility/2006">
     <mc:Choice xmlns:p14="http://schemas.microsoft.com/office/powerpoint/2010/main" Requires="p14">
-      <p:transition spd="slow" p14:dur="2000" advTm="37305"/>
+      <p:transition spd="slow" p14:dur="2000" advTm="12637"/>
     </mc:Choice>
     <mc:Fallback>
-      <p:transition spd="slow" advTm="37305"/>
+      <p:transition spd="slow" advTm="12637"/>
     </mc:Fallback>
   </mc:AlternateContent>
   <p:timing>
@@ -27277,7 +27277,7 @@
                                       <p:cBhvr>
                                         <p:cTn id="6" dur="1" fill="hold"/>
                                         <p:tgtEl>
-                                          <p:spTgt spid="3"/>
+                                          <p:spTgt spid="22"/>
                                         </p:tgtEl>
                                       </p:cBhvr>
                                     </p:cmd>
@@ -29356,7 +29356,7 @@
                   </p:endCondLst>
                 </p:cTn>
                 <p:tgtEl>
-                  <p:spTgt spid="3"/>
+                  <p:spTgt spid="22"/>
                 </p:tgtEl>
               </p:cMediaNode>
             </p:audio>
@@ -29401,44 +29401,6 @@
           <a:chExt cx="0" cy="0"/>
         </a:xfrm>
       </p:grpSpPr>
-      <p:pic>
-        <p:nvPicPr>
-          <p:cNvPr id="3" name="Audio 2">
-            <a:hlinkClick r:id="" action="ppaction://media"/>
-            <a:extLst>
-              <a:ext uri="{FF2B5EF4-FFF2-40B4-BE49-F238E27FC236}">
-                <a16:creationId xmlns:a16="http://schemas.microsoft.com/office/drawing/2014/main" id="{85F6A1C2-21ED-4301-BC84-E8E620BF293E}"/>
-              </a:ext>
-            </a:extLst>
-          </p:cNvPr>
-          <p:cNvPicPr>
-            <a:picLocks noChangeAspect="1"/>
-          </p:cNvPicPr>
-          <p:nvPr>
-            <a:audioFile r:link="rId2"/>
-            <p:extLst>
-              <p:ext uri="{DAA4B4D4-6D71-4841-9C94-3DE7FCFB9230}">
-                <p14:media xmlns:p14="http://schemas.microsoft.com/office/powerpoint/2010/main" r:embed="rId1"/>
-              </p:ext>
-            </p:extLst>
-          </p:nvPr>
-        </p:nvPicPr>
-        <p:blipFill>
-          <a:blip r:embed="rId4"/>
-          <a:stretch>
-            <a:fillRect/>
-          </a:stretch>
-        </p:blipFill>
-        <p:spPr>
-          <a:xfrm>
-            <a:off x="11366500" y="6032500"/>
-            <a:ext cx="609600" cy="609600"/>
-          </a:xfrm>
-          <a:prstGeom prst="rect">
-            <a:avLst/>
-          </a:prstGeom>
-        </p:spPr>
-      </p:pic>
     </p:spTree>
     <p:extLst>
       <p:ext uri="{BB962C8B-B14F-4D97-AF65-F5344CB8AC3E}">
@@ -29449,131 +29411,36 @@
   <p:clrMapOvr>
     <a:masterClrMapping/>
   </p:clrMapOvr>
-  <mc:AlternateContent xmlns:mc="http://schemas.openxmlformats.org/markup-compatibility/2006">
-    <mc:Choice xmlns:p14="http://schemas.microsoft.com/office/powerpoint/2010/main" Requires="p14">
-      <p:transition spd="slow" p14:dur="2000" advTm="379"/>
-    </mc:Choice>
-    <mc:Fallback>
-      <p:transition spd="slow" advTm="379"/>
-    </mc:Fallback>
-  </mc:AlternateContent>
-  <p:timing>
-    <p:tnLst>
-      <p:par>
-        <p:cTn id="1" dur="indefinite" restart="never" nodeType="tmRoot">
-          <p:childTnLst>
-            <p:seq concurrent="1" nextAc="seek">
-              <p:cTn id="2" dur="indefinite" nodeType="mainSeq">
-                <p:childTnLst>
-                  <p:par>
-                    <p:cTn id="3" fill="hold">
-                      <p:stCondLst>
-                        <p:cond delay="indefinite"/>
-                        <p:cond evt="onBegin" delay="0">
-                          <p:tn val="2"/>
-                        </p:cond>
-                      </p:stCondLst>
-                      <p:childTnLst>
-                        <p:par>
-                          <p:cTn id="4" fill="hold">
-                            <p:stCondLst>
-                              <p:cond delay="0"/>
-                            </p:stCondLst>
-                            <p:childTnLst>
-                              <p:par>
-                                <p:cTn id="5" presetID="1" presetClass="mediacall" presetSubtype="0" fill="hold" nodeType="afterEffect">
-                                  <p:stCondLst>
-                                    <p:cond delay="0"/>
-                                  </p:stCondLst>
-                                  <p:childTnLst>
-                                    <p:cmd type="call" cmd="playFrom(0.0)">
-                                      <p:cBhvr>
-                                        <p:cTn id="6" dur="1" fill="hold"/>
-                                        <p:tgtEl>
-                                          <p:spTgt spid="3"/>
-                                        </p:tgtEl>
-                                      </p:cBhvr>
-                                    </p:cmd>
-                                  </p:childTnLst>
-                                </p:cTn>
-                              </p:par>
-                            </p:childTnLst>
-                          </p:cTn>
-                        </p:par>
-                      </p:childTnLst>
-                    </p:cTn>
-                  </p:par>
-                </p:childTnLst>
-              </p:cTn>
-              <p:prevCondLst>
-                <p:cond evt="onPrev" delay="0">
-                  <p:tgtEl>
-                    <p:sldTgt/>
-                  </p:tgtEl>
-                </p:cond>
-              </p:prevCondLst>
-              <p:nextCondLst>
-                <p:cond evt="onNext" delay="0">
-                  <p:tgtEl>
-                    <p:sldTgt/>
-                  </p:tgtEl>
-                </p:cond>
-              </p:nextCondLst>
-            </p:seq>
-            <p:audio isNarration="1">
-              <p:cMediaNode vol="80000" showWhenStopped="0">
-                <p:cTn id="7" fill="hold" display="0">
-                  <p:stCondLst>
-                    <p:cond delay="indefinite"/>
-                  </p:stCondLst>
-                  <p:endCondLst>
-                    <p:cond evt="onStopAudio" delay="0">
-                      <p:tgtEl>
-                        <p:sldTgt/>
-                      </p:tgtEl>
-                    </p:cond>
-                  </p:endCondLst>
-                </p:cTn>
-                <p:tgtEl>
-                  <p:spTgt spid="3"/>
-                </p:tgtEl>
-              </p:cMediaNode>
-            </p:audio>
-          </p:childTnLst>
-        </p:cTn>
-      </p:par>
-    </p:tnLst>
-  </p:timing>
 </p:sld>
 </file>
 
 <file path=ppt/tags/tag1.xml><?xml version="1.0" encoding="utf-8"?>
 <p:tagLst xmlns:a="http://schemas.openxmlformats.org/drawingml/2006/main" xmlns:r="http://schemas.openxmlformats.org/officeDocument/2006/relationships" xmlns:p="http://schemas.openxmlformats.org/presentationml/2006/main">
-  <p:tag name="TIMING" val="|0.9|16.9|1.4|5.6|4.2"/>
+  <p:tag name="TIMING" val="|0.7|11.5|1.8|4.1|2.8"/>
 </p:tagLst>
 </file>
 
 <file path=ppt/tags/tag2.xml><?xml version="1.0" encoding="utf-8"?>
 <p:tagLst xmlns:a="http://schemas.openxmlformats.org/drawingml/2006/main" xmlns:r="http://schemas.openxmlformats.org/officeDocument/2006/relationships" xmlns:p="http://schemas.openxmlformats.org/presentationml/2006/main">
-  <p:tag name="TIMING" val="|1|5|2.4|5.8|9.4"/>
+  <p:tag name="TIMING" val="|0.3|3.6|8.1|5.3|4.9"/>
 </p:tagLst>
 </file>
 
 <file path=ppt/tags/tag3.xml><?xml version="1.0" encoding="utf-8"?>
 <p:tagLst xmlns:a="http://schemas.openxmlformats.org/drawingml/2006/main" xmlns:r="http://schemas.openxmlformats.org/officeDocument/2006/relationships" xmlns:p="http://schemas.openxmlformats.org/presentationml/2006/main">
-  <p:tag name="TIMING" val="|5.6|4.3|9.2"/>
+  <p:tag name="TIMING" val="|1.5|3.5"/>
 </p:tagLst>
 </file>
 
 <file path=ppt/tags/tag4.xml><?xml version="1.0" encoding="utf-8"?>
 <p:tagLst xmlns:a="http://schemas.openxmlformats.org/drawingml/2006/main" xmlns:r="http://schemas.openxmlformats.org/officeDocument/2006/relationships" xmlns:p="http://schemas.openxmlformats.org/presentationml/2006/main">
-  <p:tag name="TIMING" val="|1.1|7.6|2|2.1|6.3|4.8|5.4|3.1|0.8|0.4|0.4|4.5|2.3"/>
+  <p:tag name="TIMING" val="|0.3|1.4|4.8|1.8|1.5|2.2|2.3|8.4|2.1|4.5|2.2|2.8|0.6"/>
 </p:tagLst>
 </file>
 
 <file path=ppt/tags/tag5.xml><?xml version="1.0" encoding="utf-8"?>
 <p:tagLst xmlns:a="http://schemas.openxmlformats.org/drawingml/2006/main" xmlns:r="http://schemas.openxmlformats.org/officeDocument/2006/relationships" xmlns:p="http://schemas.openxmlformats.org/presentationml/2006/main">
-  <p:tag name="TIMING" val="|0.4|20|12.6"/>
+  <p:tag name="TIMING" val="|0.2|3.4|5.3"/>
 </p:tagLst>
 </file>
 

</xml_diff>